<commit_message>
Ajustes de telas e inicio de Metas
metas 2/...
</commit_message>
<xml_diff>
--- a/ARQUIVOS DE ORGANIZAÇÃO/sdsdasd.pptx
+++ b/ARQUIVOS DE ORGANIZAÇÃO/sdsdasd.pptx
@@ -264,7 +264,7 @@
           <a:p>
             <a:fld id="{C457A184-CA39-4F09-92D4-120447C72D37}" type="datetimeFigureOut">
               <a:rPr lang="pt-BR" smtClean="0"/>
-              <a:t>11/06/2022</a:t>
+              <a:t>14/06/2022</a:t>
             </a:fld>
             <a:endParaRPr lang="pt-BR"/>
           </a:p>
@@ -462,7 +462,7 @@
           <a:p>
             <a:fld id="{C457A184-CA39-4F09-92D4-120447C72D37}" type="datetimeFigureOut">
               <a:rPr lang="pt-BR" smtClean="0"/>
-              <a:t>11/06/2022</a:t>
+              <a:t>14/06/2022</a:t>
             </a:fld>
             <a:endParaRPr lang="pt-BR"/>
           </a:p>
@@ -670,7 +670,7 @@
           <a:p>
             <a:fld id="{C457A184-CA39-4F09-92D4-120447C72D37}" type="datetimeFigureOut">
               <a:rPr lang="pt-BR" smtClean="0"/>
-              <a:t>11/06/2022</a:t>
+              <a:t>14/06/2022</a:t>
             </a:fld>
             <a:endParaRPr lang="pt-BR"/>
           </a:p>
@@ -868,7 +868,7 @@
           <a:p>
             <a:fld id="{C457A184-CA39-4F09-92D4-120447C72D37}" type="datetimeFigureOut">
               <a:rPr lang="pt-BR" smtClean="0"/>
-              <a:t>11/06/2022</a:t>
+              <a:t>14/06/2022</a:t>
             </a:fld>
             <a:endParaRPr lang="pt-BR"/>
           </a:p>
@@ -1143,7 +1143,7 @@
           <a:p>
             <a:fld id="{C457A184-CA39-4F09-92D4-120447C72D37}" type="datetimeFigureOut">
               <a:rPr lang="pt-BR" smtClean="0"/>
-              <a:t>11/06/2022</a:t>
+              <a:t>14/06/2022</a:t>
             </a:fld>
             <a:endParaRPr lang="pt-BR"/>
           </a:p>
@@ -1408,7 +1408,7 @@
           <a:p>
             <a:fld id="{C457A184-CA39-4F09-92D4-120447C72D37}" type="datetimeFigureOut">
               <a:rPr lang="pt-BR" smtClean="0"/>
-              <a:t>11/06/2022</a:t>
+              <a:t>14/06/2022</a:t>
             </a:fld>
             <a:endParaRPr lang="pt-BR"/>
           </a:p>
@@ -1820,7 +1820,7 @@
           <a:p>
             <a:fld id="{C457A184-CA39-4F09-92D4-120447C72D37}" type="datetimeFigureOut">
               <a:rPr lang="pt-BR" smtClean="0"/>
-              <a:t>11/06/2022</a:t>
+              <a:t>14/06/2022</a:t>
             </a:fld>
             <a:endParaRPr lang="pt-BR"/>
           </a:p>
@@ -1961,7 +1961,7 @@
           <a:p>
             <a:fld id="{C457A184-CA39-4F09-92D4-120447C72D37}" type="datetimeFigureOut">
               <a:rPr lang="pt-BR" smtClean="0"/>
-              <a:t>11/06/2022</a:t>
+              <a:t>14/06/2022</a:t>
             </a:fld>
             <a:endParaRPr lang="pt-BR"/>
           </a:p>
@@ -2074,7 +2074,7 @@
           <a:p>
             <a:fld id="{C457A184-CA39-4F09-92D4-120447C72D37}" type="datetimeFigureOut">
               <a:rPr lang="pt-BR" smtClean="0"/>
-              <a:t>11/06/2022</a:t>
+              <a:t>14/06/2022</a:t>
             </a:fld>
             <a:endParaRPr lang="pt-BR"/>
           </a:p>
@@ -2385,7 +2385,7 @@
           <a:p>
             <a:fld id="{C457A184-CA39-4F09-92D4-120447C72D37}" type="datetimeFigureOut">
               <a:rPr lang="pt-BR" smtClean="0"/>
-              <a:t>11/06/2022</a:t>
+              <a:t>14/06/2022</a:t>
             </a:fld>
             <a:endParaRPr lang="pt-BR"/>
           </a:p>
@@ -2673,7 +2673,7 @@
           <a:p>
             <a:fld id="{C457A184-CA39-4F09-92D4-120447C72D37}" type="datetimeFigureOut">
               <a:rPr lang="pt-BR" smtClean="0"/>
-              <a:t>11/06/2022</a:t>
+              <a:t>14/06/2022</a:t>
             </a:fld>
             <a:endParaRPr lang="pt-BR"/>
           </a:p>
@@ -2914,7 +2914,7 @@
           <a:p>
             <a:fld id="{C457A184-CA39-4F09-92D4-120447C72D37}" type="datetimeFigureOut">
               <a:rPr lang="pt-BR" smtClean="0"/>
-              <a:t>11/06/2022</a:t>
+              <a:t>14/06/2022</a:t>
             </a:fld>
             <a:endParaRPr lang="pt-BR"/>
           </a:p>
@@ -4245,7 +4245,7 @@
             </a:r>
             <a:r>
               <a:rPr lang="pt-BR" dirty="0"/>
-              <a:t>(meta selecionara) {</a:t>
+              <a:t>(meta selecionada) {</a:t>
             </a:r>
           </a:p>
           <a:p>

</xml_diff>